<commit_message>
Added updates to SRS, and Updated Context Figure
</commit_message>
<xml_diff>
--- a/docs/SRS/SystemContextFigure.pptx
+++ b/docs/SRS/SystemContextFigure.pptx
@@ -123,6 +123,59 @@
 </p:presentation>
 </file>
 
+<file path=ppt/changesInfos/changesInfo1.xml><?xml version="1.0" encoding="utf-8"?>
+<pc:chgInfo xmlns:a="http://schemas.openxmlformats.org/drawingml/2006/main" xmlns:r="http://schemas.openxmlformats.org/officeDocument/2006/relationships" xmlns:ac="http://schemas.microsoft.com/office/drawing/2013/main/command" xmlns:pc="http://schemas.microsoft.com/office/powerpoint/2013/main/command">
+  <pc:docChgLst>
+    <pc:chgData name="Hunter Ceranic" userId="55b8025d37c61089" providerId="LiveId" clId="{FD74A4D1-FF78-45BB-901A-FE03C06AE00C}"/>
+    <pc:docChg chg="undo custSel modSld">
+      <pc:chgData name="Hunter Ceranic" userId="55b8025d37c61089" providerId="LiveId" clId="{FD74A4D1-FF78-45BB-901A-FE03C06AE00C}" dt="2024-02-01T19:28:17.720" v="193" actId="1076"/>
+      <pc:docMkLst>
+        <pc:docMk/>
+      </pc:docMkLst>
+      <pc:sldChg chg="modSp mod">
+        <pc:chgData name="Hunter Ceranic" userId="55b8025d37c61089" providerId="LiveId" clId="{FD74A4D1-FF78-45BB-901A-FE03C06AE00C}" dt="2024-02-01T19:28:17.720" v="193" actId="1076"/>
+        <pc:sldMkLst>
+          <pc:docMk/>
+          <pc:sldMk cId="2981099056" sldId="256"/>
+        </pc:sldMkLst>
+        <pc:spChg chg="mod">
+          <ac:chgData name="Hunter Ceranic" userId="55b8025d37c61089" providerId="LiveId" clId="{FD74A4D1-FF78-45BB-901A-FE03C06AE00C}" dt="2024-02-01T19:26:58.173" v="96" actId="1076"/>
+          <ac:spMkLst>
+            <pc:docMk/>
+            <pc:sldMk cId="2981099056" sldId="256"/>
+            <ac:spMk id="19" creationId="{00000000-0000-0000-0000-000000000000}"/>
+          </ac:spMkLst>
+        </pc:spChg>
+        <pc:spChg chg="mod">
+          <ac:chgData name="Hunter Ceranic" userId="55b8025d37c61089" providerId="LiveId" clId="{FD74A4D1-FF78-45BB-901A-FE03C06AE00C}" dt="2024-02-01T19:28:17.720" v="193" actId="1076"/>
+          <ac:spMkLst>
+            <pc:docMk/>
+            <pc:sldMk cId="2981099056" sldId="256"/>
+            <ac:spMk id="34" creationId="{00000000-0000-0000-0000-000000000000}"/>
+          </ac:spMkLst>
+        </pc:spChg>
+        <pc:spChg chg="mod">
+          <ac:chgData name="Hunter Ceranic" userId="55b8025d37c61089" providerId="LiveId" clId="{FD74A4D1-FF78-45BB-901A-FE03C06AE00C}" dt="2024-02-01T19:28:08.550" v="190" actId="1076"/>
+          <ac:spMkLst>
+            <pc:docMk/>
+            <pc:sldMk cId="2981099056" sldId="256"/>
+            <ac:spMk id="35" creationId="{00000000-0000-0000-0000-000000000000}"/>
+          </ac:spMkLst>
+        </pc:spChg>
+        <pc:grpChg chg="mod">
+          <ac:chgData name="Hunter Ceranic" userId="55b8025d37c61089" providerId="LiveId" clId="{FD74A4D1-FF78-45BB-901A-FE03C06AE00C}" dt="2024-02-01T19:22:24.800" v="1" actId="1076"/>
+          <ac:grpSpMkLst>
+            <pc:docMk/>
+            <pc:sldMk cId="2981099056" sldId="256"/>
+            <ac:grpSpMk id="90" creationId="{00000000-0000-0000-0000-000000000000}"/>
+          </ac:grpSpMkLst>
+        </pc:grpChg>
+      </pc:sldChg>
+    </pc:docChg>
+  </pc:docChgLst>
+</pc:chgInfo>
+</file>
+
 <file path=ppt/slideLayouts/slideLayout1.xml><?xml version="1.0" encoding="utf-8"?>
 <p:sldLayout xmlns:a="http://schemas.openxmlformats.org/drawingml/2006/main" xmlns:r="http://schemas.openxmlformats.org/officeDocument/2006/relationships" xmlns:p="http://schemas.openxmlformats.org/presentationml/2006/main" type="title" preserve="1">
   <p:cSld name="Title Slide">
@@ -304,7 +357,7 @@
           <a:p>
             <a:fld id="{779256A2-DE0C-7447-B687-786F38514E8C}" type="datetimeFigureOut">
               <a:rPr lang="en-US" smtClean="0"/>
-              <a:t>9/4/19</a:t>
+              <a:t>2/1/2024</a:t>
             </a:fld>
             <a:endParaRPr lang="en-US"/>
           </a:p>
@@ -474,7 +527,7 @@
           <a:p>
             <a:fld id="{779256A2-DE0C-7447-B687-786F38514E8C}" type="datetimeFigureOut">
               <a:rPr lang="en-US" smtClean="0"/>
-              <a:t>9/4/19</a:t>
+              <a:t>2/1/2024</a:t>
             </a:fld>
             <a:endParaRPr lang="en-US"/>
           </a:p>
@@ -654,7 +707,7 @@
           <a:p>
             <a:fld id="{779256A2-DE0C-7447-B687-786F38514E8C}" type="datetimeFigureOut">
               <a:rPr lang="en-US" smtClean="0"/>
-              <a:t>9/4/19</a:t>
+              <a:t>2/1/2024</a:t>
             </a:fld>
             <a:endParaRPr lang="en-US"/>
           </a:p>
@@ -824,7 +877,7 @@
           <a:p>
             <a:fld id="{779256A2-DE0C-7447-B687-786F38514E8C}" type="datetimeFigureOut">
               <a:rPr lang="en-US" smtClean="0"/>
-              <a:t>9/4/19</a:t>
+              <a:t>2/1/2024</a:t>
             </a:fld>
             <a:endParaRPr lang="en-US"/>
           </a:p>
@@ -1070,7 +1123,7 @@
           <a:p>
             <a:fld id="{779256A2-DE0C-7447-B687-786F38514E8C}" type="datetimeFigureOut">
               <a:rPr lang="en-US" smtClean="0"/>
-              <a:t>9/4/19</a:t>
+              <a:t>2/1/2024</a:t>
             </a:fld>
             <a:endParaRPr lang="en-US"/>
           </a:p>
@@ -1358,7 +1411,7 @@
           <a:p>
             <a:fld id="{779256A2-DE0C-7447-B687-786F38514E8C}" type="datetimeFigureOut">
               <a:rPr lang="en-US" smtClean="0"/>
-              <a:t>9/4/19</a:t>
+              <a:t>2/1/2024</a:t>
             </a:fld>
             <a:endParaRPr lang="en-US"/>
           </a:p>
@@ -1780,7 +1833,7 @@
           <a:p>
             <a:fld id="{779256A2-DE0C-7447-B687-786F38514E8C}" type="datetimeFigureOut">
               <a:rPr lang="en-US" smtClean="0"/>
-              <a:t>9/4/19</a:t>
+              <a:t>2/1/2024</a:t>
             </a:fld>
             <a:endParaRPr lang="en-US"/>
           </a:p>
@@ -1898,7 +1951,7 @@
           <a:p>
             <a:fld id="{779256A2-DE0C-7447-B687-786F38514E8C}" type="datetimeFigureOut">
               <a:rPr lang="en-US" smtClean="0"/>
-              <a:t>9/4/19</a:t>
+              <a:t>2/1/2024</a:t>
             </a:fld>
             <a:endParaRPr lang="en-US"/>
           </a:p>
@@ -1993,7 +2046,7 @@
           <a:p>
             <a:fld id="{779256A2-DE0C-7447-B687-786F38514E8C}" type="datetimeFigureOut">
               <a:rPr lang="en-US" smtClean="0"/>
-              <a:t>9/4/19</a:t>
+              <a:t>2/1/2024</a:t>
             </a:fld>
             <a:endParaRPr lang="en-US"/>
           </a:p>
@@ -2270,7 +2323,7 @@
           <a:p>
             <a:fld id="{779256A2-DE0C-7447-B687-786F38514E8C}" type="datetimeFigureOut">
               <a:rPr lang="en-US" smtClean="0"/>
-              <a:t>9/4/19</a:t>
+              <a:t>2/1/2024</a:t>
             </a:fld>
             <a:endParaRPr lang="en-US"/>
           </a:p>
@@ -2523,7 +2576,7 @@
           <a:p>
             <a:fld id="{779256A2-DE0C-7447-B687-786F38514E8C}" type="datetimeFigureOut">
               <a:rPr lang="en-US" smtClean="0"/>
-              <a:t>9/4/19</a:t>
+              <a:t>2/1/2024</a:t>
             </a:fld>
             <a:endParaRPr lang="en-US"/>
           </a:p>
@@ -2736,7 +2789,7 @@
           <a:p>
             <a:fld id="{779256A2-DE0C-7447-B687-786F38514E8C}" type="datetimeFigureOut">
               <a:rPr lang="en-US" smtClean="0"/>
-              <a:t>9/4/19</a:t>
+              <a:t>2/1/2024</a:t>
             </a:fld>
             <a:endParaRPr lang="en-US"/>
           </a:p>
@@ -3119,10 +3172,10 @@
         </p:nvGrpSpPr>
         <p:grpSpPr>
           <a:xfrm>
-            <a:off x="189913" y="2868373"/>
-            <a:ext cx="8858711" cy="1252941"/>
-            <a:chOff x="189913" y="3381165"/>
-            <a:chExt cx="8858711" cy="1252941"/>
+            <a:off x="189913" y="2851798"/>
+            <a:ext cx="8858711" cy="1269516"/>
+            <a:chOff x="189913" y="3364590"/>
+            <a:chExt cx="8858711" cy="1269516"/>
           </a:xfrm>
         </p:grpSpPr>
         <p:grpSp>
@@ -3333,9 +3386,9 @@
           <p:grpSpPr>
             <a:xfrm>
               <a:off x="3885481" y="3381165"/>
-              <a:ext cx="1523744" cy="1246370"/>
+              <a:ext cx="1483694" cy="1246370"/>
               <a:chOff x="3703297" y="1721177"/>
-              <a:chExt cx="1523744" cy="1246370"/>
+              <a:chExt cx="1483694" cy="1246370"/>
             </a:xfrm>
           </p:grpSpPr>
           <p:sp>
@@ -3394,8 +3447,8 @@
             </p:nvSpPr>
             <p:spPr>
               <a:xfrm>
-                <a:off x="3726309" y="2113529"/>
-                <a:ext cx="1500732" cy="461665"/>
+                <a:off x="3974488" y="2120100"/>
+                <a:ext cx="835485" cy="461665"/>
               </a:xfrm>
               <a:prstGeom prst="rect">
                 <a:avLst/>
@@ -3409,16 +3462,12 @@
               <a:lstStyle/>
               <a:p>
                 <a:r>
-                  <a:rPr lang="en-US" sz="2400" dirty="0" err="1">
+                  <a:rPr lang="en-US" sz="2400" dirty="0">
                     <a:latin typeface="Times New Roman"/>
                     <a:cs typeface="Times New Roman"/>
                   </a:rPr>
-                  <a:t>ProgName</a:t>
+                  <a:t>OAR</a:t>
                 </a:r>
-                <a:endParaRPr lang="en-US" sz="2400" dirty="0">
-                  <a:latin typeface="Times New Roman"/>
-                  <a:cs typeface="Times New Roman"/>
-                </a:endParaRPr>
               </a:p>
             </p:txBody>
           </p:sp>
@@ -3508,8 +3557,8 @@
           </p:nvSpPr>
           <p:spPr>
             <a:xfrm>
-              <a:off x="1745191" y="3577615"/>
-              <a:ext cx="1114408" cy="369332"/>
+              <a:off x="1987266" y="3580244"/>
+              <a:ext cx="1178528" cy="369332"/>
             </a:xfrm>
             <a:prstGeom prst="rect">
               <a:avLst/>
@@ -3527,7 +3576,7 @@
                   <a:latin typeface="Times New Roman"/>
                   <a:cs typeface="Times New Roman"/>
                 </a:rPr>
-                <a:t>Inputs: …</a:t>
+                <a:t>Image File</a:t>
               </a:r>
             </a:p>
           </p:txBody>
@@ -3540,8 +3589,8 @@
           </p:nvSpPr>
           <p:spPr>
             <a:xfrm>
-              <a:off x="5369175" y="3577615"/>
-              <a:ext cx="1268296" cy="369332"/>
+              <a:off x="5473753" y="3364590"/>
+              <a:ext cx="2140060" cy="646331"/>
             </a:xfrm>
             <a:prstGeom prst="rect">
               <a:avLst/>
@@ -3549,17 +3598,18 @@
             <a:noFill/>
           </p:spPr>
           <p:txBody>
-            <a:bodyPr wrap="none" rtlCol="0">
+            <a:bodyPr wrap="square" rtlCol="0">
               <a:spAutoFit/>
             </a:bodyPr>
             <a:lstStyle/>
             <a:p>
+              <a:pPr algn="ctr"/>
               <a:r>
                 <a:rPr lang="en-US" dirty="0">
                   <a:latin typeface="Times New Roman"/>
                   <a:cs typeface="Times New Roman"/>
                 </a:rPr>
-                <a:t>Outputs: …</a:t>
+                <a:t>Predicted Character Confidence Level</a:t>
               </a:r>
             </a:p>
           </p:txBody>

</xml_diff>